<commit_message>
final submit for presentaion
</commit_message>
<xml_diff>
--- a/docs/final_presentation_release.pptx
+++ b/docs/final_presentation_release.pptx
@@ -5062,12 +5062,13 @@
             </a:r>
             <a:r>
               <a:rPr lang="en-US" dirty="0" err="1" smtClean="0"/>
-              <a:t>wifi</a:t>
+              <a:t>WiFi</a:t>
             </a:r>
             <a:r>
               <a:rPr lang="en-US" dirty="0" smtClean="0"/>
               <a:t>-capable</a:t>
             </a:r>
+            <a:endParaRPr lang="en-US" dirty="0" smtClean="0"/>
           </a:p>
         </p:txBody>
       </p:sp>
@@ -5285,7 +5286,7 @@
             <a:pPr lvl="1"/>
             <a:r>
               <a:rPr lang="en-US" sz="2400" dirty="0" err="1" smtClean="0"/>
-              <a:t>Riachu_setStatusParameters</a:t>
+              <a:t>Raichu_setStatusParameters</a:t>
             </a:r>
             <a:r>
               <a:rPr lang="en-US" sz="2400" dirty="0" smtClean="0"/>
@@ -5296,7 +5297,7 @@
             <a:pPr lvl="1"/>
             <a:r>
               <a:rPr lang="en-US" sz="2400" dirty="0" err="1" smtClean="0"/>
-              <a:t>Riachu_getConnectedClient</a:t>
+              <a:t>Raichu_getConnectedClient</a:t>
             </a:r>
             <a:r>
               <a:rPr lang="en-US" sz="2400" dirty="0" smtClean="0"/>
@@ -5306,8 +5307,8 @@
           <a:p>
             <a:pPr lvl="1"/>
             <a:r>
-              <a:rPr lang="en-US" sz="2400" dirty="0" err="1" smtClean="0"/>
-              <a:t>Riachu_getServerStatus</a:t>
+              <a:rPr lang="en-US" sz="2400" smtClean="0"/>
+              <a:t>Raichu_getServerStatus</a:t>
             </a:r>
             <a:r>
               <a:rPr lang="en-US" sz="2400" dirty="0" smtClean="0"/>
@@ -7793,7 +7794,15 @@
           <a:p>
             <a:r>
               <a:rPr lang="en-US" sz="2800" dirty="0" smtClean="0"/>
-              <a:t>With RAICHU enabled devices users will be able to access and control their devices from any where they can access the web. </a:t>
+              <a:t>With </a:t>
+            </a:r>
+            <a:r>
+              <a:rPr lang="en-US" sz="2800" dirty="0" smtClean="0"/>
+              <a:t>RAICHU </a:t>
+            </a:r>
+            <a:r>
+              <a:rPr lang="en-US" sz="2800" dirty="0" smtClean="0"/>
+              <a:t>enabled devices users will be able to access and control their devices from any where they can access the web. </a:t>
             </a:r>
           </a:p>
           <a:p>
@@ -7805,7 +7814,11 @@
           <a:p>
             <a:r>
               <a:rPr lang="en-US" sz="2800" dirty="0" smtClean="0"/>
-              <a:t>RAIHCU gives you the capability to control ‘</a:t>
+              <a:t>RAICHU </a:t>
+            </a:r>
+            <a:r>
+              <a:rPr lang="en-US" sz="2800" dirty="0" smtClean="0"/>
+              <a:t>gives you the capability to control ‘</a:t>
             </a:r>
             <a:r>
               <a:rPr lang="en-US" sz="2800" dirty="0" err="1" smtClean="0"/>

</xml_diff>